<commit_message>
revised alpha to beta
</commit_message>
<xml_diff>
--- a/Project2/Reports/Project 2 interim.pptx
+++ b/Project2/Reports/Project 2 interim.pptx
@@ -6358,7 +6358,7 @@
           <p:cNvPr id="2" name="Title 1">
             <a:extLst>
               <a:ext uri="{FF2B5EF4-FFF2-40B4-BE49-F238E27FC236}">
-                <a16:creationId xmlns="" xmlns:a16="http://schemas.microsoft.com/office/drawing/2014/main" id="{A5BB4555-5C41-AB4E-AF47-7E61B4A9F554}"/>
+                <a16:creationId xmlns:a16="http://schemas.microsoft.com/office/drawing/2014/main" xmlns="" id="{A5BB4555-5C41-AB4E-AF47-7E61B4A9F554}"/>
               </a:ext>
             </a:extLst>
           </p:cNvPr>
@@ -6393,17 +6393,7 @@
                   </a:schemeClr>
                 </a:solidFill>
               </a:rPr>
-              <a:t>Project2 interim presentation: Linear </a:t>
-            </a:r>
-            <a:r>
-              <a:rPr lang="en-US" sz="4000" dirty="0" smtClean="0">
-                <a:solidFill>
-                  <a:schemeClr val="bg1">
-                    <a:lumMod val="50000"/>
-                  </a:schemeClr>
-                </a:solidFill>
-              </a:rPr>
-              <a:t>mixed model with non-normal distribution of random components</a:t>
+              <a:t>Project2 interim presentation: Linear mixed model with non-normal distribution of random components</a:t>
             </a:r>
             <a:r>
               <a:rPr lang="en-US" dirty="0" smtClean="0">
@@ -6455,14 +6445,14 @@
           </a:p>
         </p:txBody>
       </p:sp>
-      <mc:AlternateContent xmlns:mc="http://schemas.openxmlformats.org/markup-compatibility/2006">
-        <mc:Choice xmlns:a14="http://schemas.microsoft.com/office/drawing/2010/main" Requires="a14">
+      <mc:AlternateContent xmlns:mc="http://schemas.openxmlformats.org/markup-compatibility/2006" xmlns:a14="http://schemas.microsoft.com/office/drawing/2010/main">
+        <mc:Choice Requires="a14">
           <p:sp>
             <p:nvSpPr>
               <p:cNvPr id="3" name="Content Placeholder 2">
                 <a:extLst>
                   <a:ext uri="{FF2B5EF4-FFF2-40B4-BE49-F238E27FC236}">
-                    <a16:creationId xmlns="" xmlns:a16="http://schemas.microsoft.com/office/drawing/2014/main" id="{9B7DB3B7-AA04-EB40-9807-E1F03014FC26}"/>
+                    <a16:creationId xmlns:a16="http://schemas.microsoft.com/office/drawing/2014/main" xmlns="" id="{9B7DB3B7-AA04-EB40-9807-E1F03014FC26}"/>
                   </a:ext>
                 </a:extLst>
               </p:cNvPr>
@@ -6615,11 +6605,7 @@
                 </a:r>
                 <a:r>
                   <a:rPr lang="en-US" b="1" dirty="0" smtClean="0"/>
-                  <a:t>NOT</a:t>
-                </a:r>
-                <a:r>
-                  <a:rPr lang="en-US" b="1" dirty="0" smtClean="0"/>
-                  <a:t> NORMALLY</a:t>
+                  <a:t>NOT NORMALLY</a:t>
                 </a:r>
                 <a:r>
                   <a:rPr lang="en-US" dirty="0" smtClean="0"/>
@@ -6682,11 +6668,7 @@
                 </a:r>
                 <a:r>
                   <a:rPr lang="en-US" dirty="0" smtClean="0"/>
-                  <a:t>he </a:t>
-                </a:r>
-                <a:r>
-                  <a:rPr lang="en-US" dirty="0" smtClean="0"/>
-                  <a:t>Type I/II </a:t>
+                  <a:t>he Type I/II </a:t>
                 </a:r>
                 <a:r>
                   <a:rPr lang="en-US" dirty="0"/>
@@ -6696,7 +6678,7 @@
             </p:txBody>
           </p:sp>
         </mc:Choice>
-        <mc:Fallback>
+        <mc:Fallback xmlns="">
           <p:sp>
             <p:nvSpPr>
               <p:cNvPr id="3" name="Content Placeholder 2">
@@ -6818,7 +6800,7 @@
           <p:cNvPr id="2" name="Title 1">
             <a:extLst>
               <a:ext uri="{FF2B5EF4-FFF2-40B4-BE49-F238E27FC236}">
-                <a16:creationId xmlns="" xmlns:a16="http://schemas.microsoft.com/office/drawing/2014/main" id="{BA7FFAC6-5999-CE46-BA63-3F88FD4F16D5}"/>
+                <a16:creationId xmlns:a16="http://schemas.microsoft.com/office/drawing/2014/main" xmlns="" id="{BA7FFAC6-5999-CE46-BA63-3F88FD4F16D5}"/>
               </a:ext>
             </a:extLst>
           </p:cNvPr>
@@ -6858,7 +6840,7 @@
           <p:cNvPr id="3" name="Content Placeholder 2">
             <a:extLst>
               <a:ext uri="{FF2B5EF4-FFF2-40B4-BE49-F238E27FC236}">
-                <a16:creationId xmlns="" xmlns:a16="http://schemas.microsoft.com/office/drawing/2014/main" id="{B5ABBD12-F1F4-6143-A67D-2DCE70C17F44}"/>
+                <a16:creationId xmlns:a16="http://schemas.microsoft.com/office/drawing/2014/main" xmlns="" id="{B5ABBD12-F1F4-6143-A67D-2DCE70C17F44}"/>
               </a:ext>
             </a:extLst>
           </p:cNvPr>
@@ -6896,7 +6878,6 @@
               <a:rPr lang="en-US" dirty="0" smtClean="0"/>
               <a:t>3 settings of subjects: </a:t>
             </a:r>
-            <a:endParaRPr lang="en-US" dirty="0" smtClean="0"/>
           </a:p>
           <a:p>
             <a:pPr lvl="2"/>
@@ -6910,22 +6891,14 @@
             </a:r>
             <a:r>
               <a:rPr lang="en-US" sz="1600" dirty="0" smtClean="0"/>
-              <a:t>=</a:t>
-            </a:r>
-            <a:r>
-              <a:rPr lang="en-US" sz="1600" dirty="0" smtClean="0"/>
-              <a:t>20, 200, 1000</a:t>
+              <a:t>=20, 200, 1000</a:t>
             </a:r>
           </a:p>
           <a:p>
             <a:pPr lvl="1"/>
             <a:r>
               <a:rPr lang="en-US" dirty="0" smtClean="0"/>
-              <a:t>2</a:t>
-            </a:r>
-            <a:r>
-              <a:rPr lang="en-US" dirty="0" smtClean="0"/>
-              <a:t> settings fixed </a:t>
+              <a:t>2 settings fixed </a:t>
             </a:r>
             <a:r>
               <a:rPr lang="en-US" dirty="0"/>
@@ -6938,7 +6911,6 @@
               <a:rPr lang="en-US" sz="1600" dirty="0" smtClean="0"/>
               <a:t>Treatment</a:t>
             </a:r>
-            <a:endParaRPr lang="en-US" sz="1600" dirty="0" smtClean="0"/>
           </a:p>
           <a:p>
             <a:pPr lvl="2"/>
@@ -7024,7 +6996,6 @@
               <a:rPr lang="en-US" sz="1600" dirty="0" smtClean="0"/>
               <a:t>Mixture: mixed two normal distribution</a:t>
             </a:r>
-            <a:endParaRPr lang="en-US" sz="1600" dirty="0" smtClean="0"/>
           </a:p>
           <a:p>
             <a:pPr marL="742950" lvl="2" indent="-342900"/>
@@ -7040,7 +7011,6 @@
               <a:rPr lang="en-US" sz="1600" dirty="0" smtClean="0"/>
               <a:t>setting</a:t>
             </a:r>
-            <a:endParaRPr lang="en-US" sz="1600" dirty="0" smtClean="0"/>
           </a:p>
         </p:txBody>
       </p:sp>
@@ -7112,18 +7082,7 @@
                   </a:schemeClr>
                 </a:solidFill>
               </a:rPr>
-              <a:t>We take a longitudinal clinical trial dataset for </a:t>
-            </a:r>
-            <a:r>
-              <a:rPr lang="en-US" sz="1600" b="1" dirty="0">
-                <a:solidFill>
-                  <a:schemeClr val="tx1">
-                    <a:lumMod val="75000"/>
-                    <a:lumOff val="25000"/>
-                  </a:schemeClr>
-                </a:solidFill>
-              </a:rPr>
-              <a:t>example: </a:t>
+              <a:t>We take a longitudinal clinical trial dataset for example: </a:t>
             </a:r>
             <a:endParaRPr lang="en-US" sz="1600" b="1" dirty="0" smtClean="0">
               <a:solidFill>
@@ -7287,7 +7246,7 @@
           <p:cNvPr id="8" name="Content Placeholder 2">
             <a:extLst>
               <a:ext uri="{FF2B5EF4-FFF2-40B4-BE49-F238E27FC236}">
-                <a16:creationId xmlns="" xmlns:a16="http://schemas.microsoft.com/office/drawing/2014/main" id="{B5ABBD12-F1F4-6143-A67D-2DCE70C17F44}"/>
+                <a16:creationId xmlns:a16="http://schemas.microsoft.com/office/drawing/2014/main" xmlns="" id="{B5ABBD12-F1F4-6143-A67D-2DCE70C17F44}"/>
               </a:ext>
             </a:extLst>
           </p:cNvPr>
@@ -7584,7 +7543,6 @@
               <a:rPr lang="en-US" dirty="0" smtClean="0"/>
               <a:t>We assumed that the random components are normally distributed</a:t>
             </a:r>
-            <a:endParaRPr lang="en-US" dirty="0" smtClean="0"/>
           </a:p>
         </p:txBody>
       </p:sp>
@@ -7674,7 +7632,7 @@
                 <p:ph idx="1"/>
                 <p:extLst>
                   <p:ext uri="{D42A27DB-BD31-4B8C-83A1-F6EECF244321}">
-                    <p14:modId xmlns:p14="http://schemas.microsoft.com/office/powerpoint/2010/main" val="3941945525"/>
+                    <p14:modId xmlns:p14="http://schemas.microsoft.com/office/powerpoint/2010/main" val="4200599983"/>
                   </p:ext>
                 </p:extLst>
               </p:nvPr>
@@ -8174,11 +8132,7 @@
                           <a:pPr algn="ctr"/>
                           <a:r>
                             <a:rPr lang="en-US" sz="1400" kern="1200" dirty="0" smtClean="0"/>
-                            <a:t>(</a:t>
-                          </a:r>
-                          <a:r>
-                            <a:rPr lang="en-US" sz="1400" kern="1200" dirty="0" smtClean="0"/>
-                            <a:t>SE)</a:t>
+                            <a:t>(SE)</a:t>
                           </a:r>
                           <a:endParaRPr lang="en-US" sz="1400" kern="1200" dirty="0">
                             <a:solidFill>
@@ -9066,18 +9020,24 @@
                               <m:sSub>
                                 <m:sSubPr>
                                   <m:ctrlPr>
-                                    <a:rPr lang="en-US" sz="1400" kern="1200" smtClean="0"/>
+                                    <a:rPr lang="en-US" sz="1400" i="1" kern="1200" smtClean="0">
+                                      <a:latin typeface="Cambria Math" panose="02040503050406030204" pitchFamily="18" charset="0"/>
+                                    </a:rPr>
                                   </m:ctrlPr>
                                 </m:sSubPr>
                                 <m:e>
                                   <m:r>
-                                    <a:rPr lang="en-US" sz="1400" kern="1200" smtClean="0"/>
+                                    <a:rPr lang="en-US" sz="1400" kern="1200" smtClean="0">
+                                      <a:latin typeface="Cambria Math" panose="02040503050406030204" pitchFamily="18" charset="0"/>
+                                    </a:rPr>
                                     <m:t>𝛽</m:t>
                                   </m:r>
                                 </m:e>
                                 <m:sub>
                                   <m:r>
-                                    <a:rPr lang="en-US" sz="1400" kern="1200" smtClean="0"/>
+                                    <a:rPr lang="en-US" sz="1400" kern="1200" smtClean="0">
+                                      <a:latin typeface="Cambria Math" panose="02040503050406030204" pitchFamily="18" charset="0"/>
+                                    </a:rPr>
                                     <m:t>0</m:t>
                                   </m:r>
                                 </m:sub>
@@ -9108,44 +9068,44 @@
                           <a:pPr marL="0" algn="l" defTabSz="914400" rtl="0" eaLnBrk="1" fontAlgn="b" latinLnBrk="0" hangingPunct="1"/>
                           <a:r>
                             <a:rPr lang="en-US" sz="1400" b="1" kern="1200" dirty="0" smtClean="0"/>
-                            <a:t>1. Random </a:t>
-                          </a:r>
-                          <a:r>
-                            <a:rPr lang="en-US" sz="1400" b="1" kern="1200" dirty="0" smtClean="0"/>
-                            <a:t>variables follow skewed distribution:</a:t>
+                            <a:t>1. Random variables follow skewed distribution:</a:t>
                           </a:r>
                         </a:p>
                         <a:p>
                           <a:pPr marL="0" algn="l" defTabSz="914400" rtl="0" eaLnBrk="1" fontAlgn="b" latinLnBrk="0" hangingPunct="1"/>
                           <a:r>
                             <a:rPr lang="en-US" sz="1400" kern="1200" dirty="0" smtClean="0"/>
-                            <a:t>    </a:t>
-                          </a:r>
-                          <a:r>
-                            <a:rPr lang="en-US" sz="1400" kern="1200" dirty="0" smtClean="0"/>
-                            <a:t>1.1 </a:t>
+                            <a:t>    1.1 </a:t>
                           </a:r>
                           <a14:m>
                             <m:oMath xmlns:m="http://schemas.openxmlformats.org/officeDocument/2006/math">
                               <m:sSub>
                                 <m:sSubPr>
                                   <m:ctrlPr>
-                                    <a:rPr lang="en-US" sz="1400" kern="1200" smtClean="0"/>
+                                    <a:rPr lang="en-US" sz="1400" i="1" kern="1200" smtClean="0">
+                                      <a:latin typeface="Cambria Math" panose="02040503050406030204" pitchFamily="18" charset="0"/>
+                                    </a:rPr>
                                   </m:ctrlPr>
                                 </m:sSubPr>
                                 <m:e>
                                   <m:r>
-                                    <a:rPr lang="en-US" sz="1400" kern="1200" smtClean="0"/>
+                                    <a:rPr lang="en-US" sz="1400" kern="1200" smtClean="0">
+                                      <a:latin typeface="Cambria Math" panose="02040503050406030204" pitchFamily="18" charset="0"/>
+                                    </a:rPr>
                                     <m:t>𝑏</m:t>
                                   </m:r>
                                 </m:e>
                                 <m:sub>
                                   <m:r>
-                                    <a:rPr lang="en-US" sz="1400" kern="1200" smtClean="0"/>
+                                    <a:rPr lang="en-US" sz="1400" kern="1200" smtClean="0">
+                                      <a:latin typeface="Cambria Math" panose="02040503050406030204" pitchFamily="18" charset="0"/>
+                                    </a:rPr>
                                     <m:t>0</m:t>
                                   </m:r>
                                   <m:r>
-                                    <a:rPr lang="en-US" sz="1400" kern="1200" smtClean="0"/>
+                                    <a:rPr lang="en-US" sz="1400" kern="1200" smtClean="0">
+                                      <a:latin typeface="Cambria Math" panose="02040503050406030204" pitchFamily="18" charset="0"/>
+                                    </a:rPr>
                                     <m:t>𝑖</m:t>
                                   </m:r>
                                 </m:sub>
@@ -9161,7 +9121,9 @@
                               <m:func>
                                 <m:funcPr>
                                   <m:ctrlPr>
-                                    <a:rPr lang="en-US" sz="1400" kern="1200" dirty="0" smtClean="0"/>
+                                    <a:rPr lang="en-US" sz="1400" i="1" kern="1200" dirty="0" smtClean="0">
+                                      <a:latin typeface="Cambria Math" panose="02040503050406030204" pitchFamily="18" charset="0"/>
+                                    </a:rPr>
                                   </m:ctrlPr>
                                 </m:funcPr>
                                 <m:fName>
@@ -9169,19 +9131,25 @@
                                     <m:rPr>
                                       <m:sty m:val="p"/>
                                     </m:rPr>
-                                    <a:rPr lang="en-US" sz="1400" kern="1200" dirty="0" smtClean="0"/>
+                                    <a:rPr lang="en-US" sz="1400" kern="1200" dirty="0" smtClean="0">
+                                      <a:latin typeface="Cambria Math" panose="02040503050406030204" pitchFamily="18" charset="0"/>
+                                    </a:rPr>
                                     <m:t>log</m:t>
                                   </m:r>
                                 </m:fName>
                                 <m:e>
                                   <m:r>
-                                    <a:rPr lang="en-US" sz="1400" kern="1200" dirty="0" smtClean="0"/>
+                                    <a:rPr lang="en-US" sz="1400" kern="1200" dirty="0" smtClean="0">
+                                      <a:latin typeface="Cambria Math" panose="02040503050406030204" pitchFamily="18" charset="0"/>
+                                    </a:rPr>
                                     <m:t>𝑁</m:t>
                                   </m:r>
                                 </m:e>
                               </m:func>
                               <m:r>
-                                <a:rPr lang="en-US" sz="1400" kern="1200" dirty="0" smtClean="0"/>
+                                <a:rPr lang="en-US" sz="1400" kern="1200" dirty="0" smtClean="0">
+                                  <a:latin typeface="Cambria Math" panose="02040503050406030204" pitchFamily="18" charset="0"/>
+                                </a:rPr>
                                 <m:t>(5,3)</m:t>
                               </m:r>
                             </m:oMath>
@@ -9195,18 +9163,24 @@
                               <m:sSub>
                                 <m:sSubPr>
                                   <m:ctrlPr>
-                                    <a:rPr lang="en-US" sz="1400" kern="1200" smtClean="0"/>
+                                    <a:rPr lang="en-US" sz="1400" i="1" kern="1200" smtClean="0">
+                                      <a:latin typeface="Cambria Math" panose="02040503050406030204" pitchFamily="18" charset="0"/>
+                                    </a:rPr>
                                   </m:ctrlPr>
                                 </m:sSubPr>
                                 <m:e>
                                   <m:r>
-                                    <a:rPr lang="en-US" sz="1400" kern="1200"/>
+                                    <a:rPr lang="en-US" sz="1400" kern="1200">
+                                      <a:latin typeface="Cambria Math" panose="02040503050406030204" pitchFamily="18" charset="0"/>
+                                    </a:rPr>
                                     <m:t>𝜖</m:t>
                                   </m:r>
                                 </m:e>
                                 <m:sub>
                                   <m:r>
-                                    <a:rPr lang="en-US" sz="1400" kern="1200"/>
+                                    <a:rPr lang="en-US" sz="1400" kern="1200">
+                                      <a:latin typeface="Cambria Math" panose="02040503050406030204" pitchFamily="18" charset="0"/>
+                                    </a:rPr>
                                     <m:t>𝑖𝑗</m:t>
                                   </m:r>
                                 </m:sub>
@@ -9220,11 +9194,15 @@
                           <a14:m>
                             <m:oMath xmlns:m="http://schemas.openxmlformats.org/officeDocument/2006/math">
                               <m:r>
-                                <a:rPr lang="en-US" sz="1400" kern="1200" dirty="0" smtClean="0"/>
+                                <a:rPr lang="en-US" sz="1400" kern="1200" dirty="0" smtClean="0">
+                                  <a:latin typeface="Cambria Math" panose="02040503050406030204" pitchFamily="18" charset="0"/>
+                                </a:rPr>
                                 <m:t>𝑁</m:t>
                               </m:r>
                               <m:r>
-                                <a:rPr lang="en-US" sz="1400" kern="1200" dirty="0" smtClean="0"/>
+                                <a:rPr lang="en-US" sz="1400" kern="1200" dirty="0" smtClean="0">
+                                  <a:latin typeface="Cambria Math" panose="02040503050406030204" pitchFamily="18" charset="0"/>
+                                </a:rPr>
                                 <m:t>(0,3)</m:t>
                               </m:r>
                             </m:oMath>
@@ -9238,18 +9216,16 @@
                           <a:pPr marL="0" algn="l" defTabSz="914400" rtl="0" eaLnBrk="1" fontAlgn="b" latinLnBrk="0" hangingPunct="1"/>
                           <a:r>
                             <a:rPr lang="en-US" sz="1400" kern="1200" dirty="0" smtClean="0"/>
-                            <a:t>    </a:t>
-                          </a:r>
-                          <a:r>
-                            <a:rPr lang="en-US" sz="1400" kern="1200" dirty="0" smtClean="0"/>
-                            <a:t>1.2 </a:t>
+                            <a:t>    1.2 </a:t>
                           </a:r>
                           <a14:m>
                             <m:oMath xmlns:m="http://schemas.openxmlformats.org/officeDocument/2006/math">
                               <m:d>
                                 <m:dPr>
                                   <m:ctrlPr>
-                                    <a:rPr lang="en-US" sz="1400" kern="1200" smtClean="0"/>
+                                    <a:rPr lang="en-US" sz="1400" i="1" kern="1200" smtClean="0">
+                                      <a:latin typeface="Cambria Math" panose="02040503050406030204" pitchFamily="18" charset="0"/>
+                                    </a:rPr>
                                   </m:ctrlPr>
                                 </m:dPr>
                                 <m:e>
@@ -9257,29 +9233,39 @@
                                     <m:fPr>
                                       <m:type m:val="noBar"/>
                                       <m:ctrlPr>
-                                        <a:rPr lang="en-US" sz="1400" kern="1200" smtClean="0"/>
+                                        <a:rPr lang="en-US" sz="1400" i="1" kern="1200" smtClean="0">
+                                          <a:latin typeface="Cambria Math" panose="02040503050406030204" pitchFamily="18" charset="0"/>
+                                        </a:rPr>
                                       </m:ctrlPr>
                                     </m:fPr>
                                     <m:num>
                                       <m:sSub>
                                         <m:sSubPr>
                                           <m:ctrlPr>
-                                            <a:rPr lang="en-US" sz="1400" kern="1200" smtClean="0"/>
+                                            <a:rPr lang="en-US" sz="1400" i="1" kern="1200" smtClean="0">
+                                              <a:latin typeface="Cambria Math" panose="02040503050406030204" pitchFamily="18" charset="0"/>
+                                            </a:rPr>
                                           </m:ctrlPr>
                                         </m:sSubPr>
                                         <m:e>
                                           <m:r>
-                                            <a:rPr lang="en-US" sz="1400" kern="1200" smtClean="0"/>
+                                            <a:rPr lang="en-US" sz="1400" kern="1200" smtClean="0">
+                                              <a:latin typeface="Cambria Math" panose="02040503050406030204" pitchFamily="18" charset="0"/>
+                                            </a:rPr>
                                             <m:t>𝑏</m:t>
                                           </m:r>
                                         </m:e>
                                         <m:sub>
                                           <m:r>
-                                            <a:rPr lang="en-US" sz="1400" kern="1200" smtClean="0"/>
+                                            <a:rPr lang="en-US" sz="1400" kern="1200" smtClean="0">
+                                              <a:latin typeface="Cambria Math" panose="02040503050406030204" pitchFamily="18" charset="0"/>
+                                            </a:rPr>
                                             <m:t>0</m:t>
                                           </m:r>
                                           <m:r>
-                                            <a:rPr lang="en-US" sz="1400" kern="1200" smtClean="0"/>
+                                            <a:rPr lang="en-US" sz="1400" kern="1200" smtClean="0">
+                                              <a:latin typeface="Cambria Math" panose="02040503050406030204" pitchFamily="18" charset="0"/>
+                                            </a:rPr>
                                             <m:t>𝑖</m:t>
                                           </m:r>
                                         </m:sub>
@@ -9289,18 +9275,24 @@
                                       <m:sSub>
                                         <m:sSubPr>
                                           <m:ctrlPr>
-                                            <a:rPr lang="en-US" sz="1400" kern="1200" smtClean="0"/>
+                                            <a:rPr lang="en-US" sz="1400" i="1" kern="1200" smtClean="0">
+                                              <a:latin typeface="Cambria Math" panose="02040503050406030204" pitchFamily="18" charset="0"/>
+                                            </a:rPr>
                                           </m:ctrlPr>
                                         </m:sSubPr>
                                         <m:e>
                                           <m:r>
-                                            <a:rPr lang="en-US" sz="1400" kern="1200"/>
+                                            <a:rPr lang="en-US" sz="1400" kern="1200">
+                                              <a:latin typeface="Cambria Math" panose="02040503050406030204" pitchFamily="18" charset="0"/>
+                                            </a:rPr>
                                             <m:t>𝑏</m:t>
                                           </m:r>
                                         </m:e>
                                         <m:sub>
                                           <m:r>
-                                            <a:rPr lang="en-US" sz="1400" kern="1200" smtClean="0"/>
+                                            <a:rPr lang="en-US" sz="1400" kern="1200" smtClean="0">
+                                              <a:latin typeface="Cambria Math" panose="02040503050406030204" pitchFamily="18" charset="0"/>
+                                            </a:rPr>
                                             <m:t>1</m:t>
                                           </m:r>
                                         </m:sub>
@@ -9320,7 +9312,9 @@
                               <m:func>
                                 <m:funcPr>
                                   <m:ctrlPr>
-                                    <a:rPr lang="en-US" sz="1400" kern="1200" dirty="0" smtClean="0"/>
+                                    <a:rPr lang="en-US" sz="1400" i="1" kern="1200" dirty="0" smtClean="0">
+                                      <a:latin typeface="Cambria Math" panose="02040503050406030204" pitchFamily="18" charset="0"/>
+                                    </a:rPr>
                                   </m:ctrlPr>
                                 </m:funcPr>
                                 <m:fName>
@@ -9328,25 +9322,33 @@
                                     <m:rPr>
                                       <m:sty m:val="p"/>
                                     </m:rPr>
-                                    <a:rPr lang="en-US" sz="1400" kern="1200" dirty="0" smtClean="0"/>
+                                    <a:rPr lang="en-US" sz="1400" kern="1200" dirty="0" smtClean="0">
+                                      <a:latin typeface="Cambria Math" panose="02040503050406030204" pitchFamily="18" charset="0"/>
+                                    </a:rPr>
                                     <m:t>log</m:t>
                                   </m:r>
                                 </m:fName>
                                 <m:e>
                                   <m:r>
-                                    <a:rPr lang="en-US" sz="1400" kern="1200" dirty="0" smtClean="0"/>
+                                    <a:rPr lang="en-US" sz="1400" kern="1200" dirty="0" smtClean="0">
+                                      <a:latin typeface="Cambria Math" panose="02040503050406030204" pitchFamily="18" charset="0"/>
+                                    </a:rPr>
                                     <m:t>𝑁</m:t>
                                   </m:r>
                                 </m:e>
                               </m:func>
                               <m:r>
-                                <a:rPr lang="en-US" sz="1400" kern="1200" dirty="0" smtClean="0"/>
+                                <a:rPr lang="en-US" sz="1400" kern="1200" dirty="0" smtClean="0">
+                                  <a:latin typeface="Cambria Math" panose="02040503050406030204" pitchFamily="18" charset="0"/>
+                                </a:rPr>
                                 <m:t>(</m:t>
                               </m:r>
                               <m:d>
                                 <m:dPr>
                                   <m:ctrlPr>
-                                    <a:rPr lang="en-US" sz="1400" kern="1200" smtClean="0"/>
+                                    <a:rPr lang="en-US" sz="1400" i="1" kern="1200" smtClean="0">
+                                      <a:latin typeface="Cambria Math" panose="02040503050406030204" pitchFamily="18" charset="0"/>
+                                    </a:rPr>
                                   </m:ctrlPr>
                                 </m:dPr>
                                 <m:e>
@@ -9354,18 +9356,24 @@
                                     <m:fPr>
                                       <m:type m:val="noBar"/>
                                       <m:ctrlPr>
-                                        <a:rPr lang="en-US" sz="1400" kern="1200" smtClean="0"/>
+                                        <a:rPr lang="en-US" sz="1400" i="1" kern="1200" smtClean="0">
+                                          <a:latin typeface="Cambria Math" panose="02040503050406030204" pitchFamily="18" charset="0"/>
+                                        </a:rPr>
                                       </m:ctrlPr>
                                     </m:fPr>
                                     <m:num>
                                       <m:r>
-                                        <a:rPr lang="en-US" sz="1400" kern="1200" smtClean="0"/>
+                                        <a:rPr lang="en-US" sz="1400" kern="1200" smtClean="0">
+                                          <a:latin typeface="Cambria Math" panose="02040503050406030204" pitchFamily="18" charset="0"/>
+                                        </a:rPr>
                                         <m:t>5</m:t>
                                       </m:r>
                                     </m:num>
                                     <m:den>
                                       <m:r>
-                                        <a:rPr lang="en-US" sz="1400" kern="1200" smtClean="0"/>
+                                        <a:rPr lang="en-US" sz="1400" kern="1200" smtClean="0">
+                                          <a:latin typeface="Cambria Math" panose="02040503050406030204" pitchFamily="18" charset="0"/>
+                                        </a:rPr>
                                         <m:t>6</m:t>
                                       </m:r>
                                     </m:den>
@@ -9383,7 +9391,9 @@
                               <m:d>
                                 <m:dPr>
                                   <m:ctrlPr>
-                                    <a:rPr lang="en-US" sz="1400" kern="1200" dirty="0" smtClean="0"/>
+                                    <a:rPr lang="en-US" sz="1400" i="1" kern="1200" dirty="0" smtClean="0">
+                                      <a:latin typeface="Cambria Math" panose="02040503050406030204" pitchFamily="18" charset="0"/>
+                                    </a:rPr>
                                   </m:ctrlPr>
                                 </m:dPr>
                                 <m:e>
@@ -9391,42 +9401,56 @@
                                     <m:fPr>
                                       <m:type m:val="noBar"/>
                                       <m:ctrlPr>
-                                        <a:rPr lang="en-US" sz="1400" kern="1200" dirty="0" smtClean="0"/>
+                                        <a:rPr lang="en-US" sz="1400" i="1" kern="1200" dirty="0" smtClean="0">
+                                          <a:latin typeface="Cambria Math" panose="02040503050406030204" pitchFamily="18" charset="0"/>
+                                        </a:rPr>
                                       </m:ctrlPr>
                                     </m:fPr>
                                     <m:num>
                                       <m:r>
-                                        <a:rPr lang="en-US" sz="1400" kern="1200" dirty="0" smtClean="0"/>
+                                        <a:rPr lang="en-US" sz="1400" kern="1200" dirty="0" smtClean="0">
+                                          <a:latin typeface="Cambria Math" panose="02040503050406030204" pitchFamily="18" charset="0"/>
+                                        </a:rPr>
                                         <m:t>3</m:t>
                                       </m:r>
                                     </m:num>
                                     <m:den>
                                       <m:r>
-                                        <a:rPr lang="en-US" sz="1400" kern="1200" dirty="0" smtClean="0"/>
+                                        <a:rPr lang="en-US" sz="1400" kern="1200" dirty="0" smtClean="0">
+                                          <a:latin typeface="Cambria Math" panose="02040503050406030204" pitchFamily="18" charset="0"/>
+                                        </a:rPr>
                                         <m:t>1.5</m:t>
                                       </m:r>
                                     </m:den>
                                   </m:f>
                                   <m:r>
-                                    <a:rPr lang="en-US" sz="1400" kern="1200" dirty="0" smtClean="0"/>
+                                    <a:rPr lang="en-US" sz="1400" kern="1200" dirty="0" smtClean="0">
+                                      <a:latin typeface="Cambria Math" panose="02040503050406030204" pitchFamily="18" charset="0"/>
+                                    </a:rPr>
                                     <m:t> </m:t>
                                   </m:r>
                                   <m:f>
                                     <m:fPr>
                                       <m:type m:val="noBar"/>
                                       <m:ctrlPr>
-                                        <a:rPr lang="en-US" sz="1400" kern="1200" dirty="0" smtClean="0"/>
+                                        <a:rPr lang="en-US" sz="1400" i="1" kern="1200" dirty="0" smtClean="0">
+                                          <a:latin typeface="Cambria Math" panose="02040503050406030204" pitchFamily="18" charset="0"/>
+                                        </a:rPr>
                                       </m:ctrlPr>
                                     </m:fPr>
                                     <m:num>
                                       <m:r>
-                                        <a:rPr lang="en-US" sz="1400" kern="1200" dirty="0" smtClean="0"/>
+                                        <a:rPr lang="en-US" sz="1400" kern="1200" dirty="0" smtClean="0">
+                                          <a:latin typeface="Cambria Math" panose="02040503050406030204" pitchFamily="18" charset="0"/>
+                                        </a:rPr>
                                         <m:t>1.5</m:t>
                                       </m:r>
                                     </m:num>
                                     <m:den>
                                       <m:r>
-                                        <a:rPr lang="en-US" sz="1400" kern="1200" dirty="0" smtClean="0"/>
+                                        <a:rPr lang="en-US" sz="1400" kern="1200" dirty="0" smtClean="0">
+                                          <a:latin typeface="Cambria Math" panose="02040503050406030204" pitchFamily="18" charset="0"/>
+                                        </a:rPr>
                                         <m:t>2</m:t>
                                       </m:r>
                                     </m:den>
@@ -9434,7 +9458,9 @@
                                 </m:e>
                               </m:d>
                               <m:r>
-                                <a:rPr lang="en-US" sz="1400" kern="1200" dirty="0" smtClean="0"/>
+                                <a:rPr lang="en-US" sz="1400" kern="1200" dirty="0" smtClean="0">
+                                  <a:latin typeface="Cambria Math" panose="02040503050406030204" pitchFamily="18" charset="0"/>
+                                </a:rPr>
                                 <m:t>)</m:t>
                               </m:r>
                               <m:r>
@@ -9447,18 +9473,24 @@
                               <m:sSub>
                                 <m:sSubPr>
                                   <m:ctrlPr>
-                                    <a:rPr lang="en-US" sz="1400" kern="1200" smtClean="0"/>
+                                    <a:rPr lang="en-US" sz="1400" i="1" kern="1200" smtClean="0">
+                                      <a:latin typeface="Cambria Math" panose="02040503050406030204" pitchFamily="18" charset="0"/>
+                                    </a:rPr>
                                   </m:ctrlPr>
                                 </m:sSubPr>
                                 <m:e>
                                   <m:r>
-                                    <a:rPr lang="en-US" sz="1400" kern="1200"/>
+                                    <a:rPr lang="en-US" sz="1400" kern="1200">
+                                      <a:latin typeface="Cambria Math" panose="02040503050406030204" pitchFamily="18" charset="0"/>
+                                    </a:rPr>
                                     <m:t>𝜖</m:t>
                                   </m:r>
                                 </m:e>
                                 <m:sub>
                                   <m:r>
-                                    <a:rPr lang="en-US" sz="1400" kern="1200"/>
+                                    <a:rPr lang="en-US" sz="1400" kern="1200">
+                                      <a:latin typeface="Cambria Math" panose="02040503050406030204" pitchFamily="18" charset="0"/>
+                                    </a:rPr>
                                     <m:t>𝑖𝑗</m:t>
                                   </m:r>
                                 </m:sub>
@@ -9471,11 +9503,15 @@
                                 <m:t>~</m:t>
                               </m:r>
                               <m:r>
-                                <a:rPr lang="en-US" sz="1400" kern="1200" dirty="0" smtClean="0"/>
+                                <a:rPr lang="en-US" sz="1400" kern="1200" dirty="0" smtClean="0">
+                                  <a:latin typeface="Cambria Math" panose="02040503050406030204" pitchFamily="18" charset="0"/>
+                                </a:rPr>
                                 <m:t>𝑁</m:t>
                               </m:r>
                               <m:r>
-                                <a:rPr lang="en-US" sz="1400" kern="1200" dirty="0" smtClean="0"/>
+                                <a:rPr lang="en-US" sz="1400" kern="1200" dirty="0" smtClean="0">
+                                  <a:latin typeface="Cambria Math" panose="02040503050406030204" pitchFamily="18" charset="0"/>
+                                </a:rPr>
                                 <m:t>(0,3)</m:t>
                               </m:r>
                             </m:oMath>
@@ -9489,11 +9525,7 @@
                           <a:pPr marL="0" algn="l" defTabSz="914400" rtl="0" eaLnBrk="1" fontAlgn="b" latinLnBrk="0" hangingPunct="1"/>
                           <a:r>
                             <a:rPr lang="en-US" sz="1400" b="1" kern="1200" dirty="0" smtClean="0"/>
-                            <a:t>2. Random </a:t>
-                          </a:r>
-                          <a:r>
-                            <a:rPr lang="en-US" sz="1400" b="1" kern="1200" dirty="0" smtClean="0"/>
-                            <a:t>variables follow mixture distribution:</a:t>
+                            <a:t>2. Random variables follow mixture distribution:</a:t>
                           </a:r>
                           <a:r>
                             <a:rPr lang="en-US" sz="1400" kern="1200" dirty="0" smtClean="0"/>
@@ -9520,33 +9552,37 @@
                           </a:pPr>
                           <a:r>
                             <a:rPr lang="en-US" sz="1400" kern="1200" dirty="0" smtClean="0"/>
-                            <a:t>    </a:t>
-                          </a:r>
-                          <a:r>
-                            <a:rPr lang="en-US" sz="1400" kern="1200" dirty="0" smtClean="0"/>
-                            <a:t>2.1 </a:t>
+                            <a:t>    2.1 </a:t>
                           </a:r>
                           <a14:m>
                             <m:oMath xmlns:m="http://schemas.openxmlformats.org/officeDocument/2006/math">
                               <m:sSub>
                                 <m:sSubPr>
                                   <m:ctrlPr>
-                                    <a:rPr lang="en-US" sz="1400" kern="1200" smtClean="0"/>
+                                    <a:rPr lang="en-US" sz="1400" i="1" kern="1200" smtClean="0">
+                                      <a:latin typeface="Cambria Math" panose="02040503050406030204" pitchFamily="18" charset="0"/>
+                                    </a:rPr>
                                   </m:ctrlPr>
                                 </m:sSubPr>
                                 <m:e>
                                   <m:r>
-                                    <a:rPr lang="en-US" sz="1400" kern="1200" smtClean="0"/>
+                                    <a:rPr lang="en-US" sz="1400" kern="1200" smtClean="0">
+                                      <a:latin typeface="Cambria Math" panose="02040503050406030204" pitchFamily="18" charset="0"/>
+                                    </a:rPr>
                                     <m:t>𝑏</m:t>
                                   </m:r>
                                 </m:e>
                                 <m:sub>
                                   <m:r>
-                                    <a:rPr lang="en-US" sz="1400" kern="1200" smtClean="0"/>
+                                    <a:rPr lang="en-US" sz="1400" kern="1200" smtClean="0">
+                                      <a:latin typeface="Cambria Math" panose="02040503050406030204" pitchFamily="18" charset="0"/>
+                                    </a:rPr>
                                     <m:t>0</m:t>
                                   </m:r>
                                   <m:r>
-                                    <a:rPr lang="en-US" sz="1400" kern="1200" smtClean="0"/>
+                                    <a:rPr lang="en-US" sz="1400" kern="1200" smtClean="0">
+                                      <a:latin typeface="Cambria Math" panose="02040503050406030204" pitchFamily="18" charset="0"/>
+                                    </a:rPr>
                                     <m:t>𝑖</m:t>
                                   </m:r>
                                 </m:sub>
@@ -9562,76 +9598,104 @@
                               <m:f>
                                 <m:fPr>
                                   <m:ctrlPr>
-                                    <a:rPr lang="en-US" sz="1400" kern="1200" dirty="0" smtClean="0"/>
+                                    <a:rPr lang="en-US" sz="1400" i="1" kern="1200" dirty="0" smtClean="0">
+                                      <a:latin typeface="Cambria Math" panose="02040503050406030204" pitchFamily="18" charset="0"/>
+                                    </a:rPr>
                                   </m:ctrlPr>
                                 </m:fPr>
                                 <m:num>
                                   <m:r>
-                                    <a:rPr lang="en-US" sz="1400" kern="1200" dirty="0" smtClean="0"/>
+                                    <a:rPr lang="en-US" sz="1400" kern="1200" dirty="0" smtClean="0">
+                                      <a:latin typeface="Cambria Math" panose="02040503050406030204" pitchFamily="18" charset="0"/>
+                                    </a:rPr>
                                     <m:t>1</m:t>
                                   </m:r>
                                 </m:num>
                                 <m:den>
                                   <m:r>
-                                    <a:rPr lang="en-US" sz="1400" kern="1200" dirty="0" smtClean="0"/>
+                                    <a:rPr lang="en-US" sz="1400" kern="1200" dirty="0" smtClean="0">
+                                      <a:latin typeface="Cambria Math" panose="02040503050406030204" pitchFamily="18" charset="0"/>
+                                    </a:rPr>
                                     <m:t>3</m:t>
                                   </m:r>
                                 </m:den>
                               </m:f>
                               <m:r>
-                                <a:rPr lang="en-US" sz="1400" kern="1200" dirty="0" smtClean="0"/>
+                                <a:rPr lang="en-US" sz="1400" kern="1200" dirty="0" smtClean="0">
+                                  <a:latin typeface="Cambria Math" panose="02040503050406030204" pitchFamily="18" charset="0"/>
+                                </a:rPr>
                                 <m:t>×</m:t>
                               </m:r>
                               <m:r>
-                                <a:rPr lang="en-US" sz="1400" kern="1200" dirty="0" smtClean="0"/>
+                                <a:rPr lang="en-US" sz="1400" kern="1200" dirty="0" smtClean="0">
+                                  <a:latin typeface="Cambria Math" panose="02040503050406030204" pitchFamily="18" charset="0"/>
+                                </a:rPr>
                                 <m:t>𝑁</m:t>
                               </m:r>
                               <m:d>
                                 <m:dPr>
                                   <m:ctrlPr>
-                                    <a:rPr lang="en-US" sz="1400" kern="1200" dirty="0" smtClean="0"/>
+                                    <a:rPr lang="en-US" sz="1400" i="1" kern="1200" dirty="0" smtClean="0">
+                                      <a:latin typeface="Cambria Math" panose="02040503050406030204" pitchFamily="18" charset="0"/>
+                                    </a:rPr>
                                   </m:ctrlPr>
                                 </m:dPr>
                                 <m:e>
                                   <m:r>
-                                    <a:rPr lang="en-US" sz="1400" kern="1200" dirty="0" smtClean="0"/>
+                                    <a:rPr lang="en-US" sz="1400" kern="1200" dirty="0" smtClean="0">
+                                      <a:latin typeface="Cambria Math" panose="02040503050406030204" pitchFamily="18" charset="0"/>
+                                    </a:rPr>
                                     <m:t>0,3</m:t>
                                   </m:r>
                                 </m:e>
                               </m:d>
                               <m:r>
-                                <a:rPr lang="en-US" sz="1400" kern="1200" dirty="0" smtClean="0"/>
+                                <a:rPr lang="en-US" sz="1400" kern="1200" dirty="0" smtClean="0">
+                                  <a:latin typeface="Cambria Math" panose="02040503050406030204" pitchFamily="18" charset="0"/>
+                                </a:rPr>
                                 <m:t>+</m:t>
                               </m:r>
                               <m:f>
                                 <m:fPr>
                                   <m:ctrlPr>
-                                    <a:rPr lang="en-US" sz="1400" kern="1200" dirty="0" smtClean="0"/>
+                                    <a:rPr lang="en-US" sz="1400" i="1" kern="1200" dirty="0" smtClean="0">
+                                      <a:latin typeface="Cambria Math" panose="02040503050406030204" pitchFamily="18" charset="0"/>
+                                    </a:rPr>
                                   </m:ctrlPr>
                                 </m:fPr>
                                 <m:num>
                                   <m:r>
-                                    <a:rPr lang="en-US" sz="1400" kern="1200" dirty="0" smtClean="0"/>
+                                    <a:rPr lang="en-US" sz="1400" kern="1200" dirty="0" smtClean="0">
+                                      <a:latin typeface="Cambria Math" panose="02040503050406030204" pitchFamily="18" charset="0"/>
+                                    </a:rPr>
                                     <m:t>2</m:t>
                                   </m:r>
                                 </m:num>
                                 <m:den>
                                   <m:r>
-                                    <a:rPr lang="en-US" sz="1400" kern="1200" dirty="0" smtClean="0"/>
+                                    <a:rPr lang="en-US" sz="1400" kern="1200" dirty="0" smtClean="0">
+                                      <a:latin typeface="Cambria Math" panose="02040503050406030204" pitchFamily="18" charset="0"/>
+                                    </a:rPr>
                                     <m:t>3</m:t>
                                   </m:r>
                                 </m:den>
                               </m:f>
                               <m:r>
-                                <a:rPr lang="en-US" sz="1400" kern="1200" dirty="0" smtClean="0"/>
+                                <a:rPr lang="en-US" sz="1400" kern="1200" dirty="0" smtClean="0">
+                                  <a:latin typeface="Cambria Math" panose="02040503050406030204" pitchFamily="18" charset="0"/>
+                                </a:rPr>
                                 <m:t>×</m:t>
                               </m:r>
                               <m:r>
-                                <a:rPr lang="en-US" sz="1400" kern="1200" dirty="0" smtClean="0"/>
+                                <a:rPr lang="en-US" sz="1400" kern="1200" dirty="0" smtClean="0">
+                                  <a:latin typeface="Cambria Math" panose="02040503050406030204" pitchFamily="18" charset="0"/>
+                                </a:rPr>
                                 <m:t>𝑁</m:t>
                               </m:r>
                               <m:r>
-                                <a:rPr lang="en-US" sz="1400" kern="1200" dirty="0" smtClean="0"/>
+                                <a:rPr lang="en-US" sz="1400" kern="1200" dirty="0" smtClean="0">
+                                  <a:latin typeface="Cambria Math" panose="02040503050406030204" pitchFamily="18" charset="0"/>
+                                </a:rPr>
                                 <m:t>(0,6)</m:t>
                               </m:r>
                             </m:oMath>
@@ -9645,18 +9709,24 @@
                               <m:sSub>
                                 <m:sSubPr>
                                   <m:ctrlPr>
-                                    <a:rPr lang="en-US" sz="1400" kern="1200" smtClean="0"/>
+                                    <a:rPr lang="en-US" sz="1400" i="1" kern="1200" smtClean="0">
+                                      <a:latin typeface="Cambria Math" panose="02040503050406030204" pitchFamily="18" charset="0"/>
+                                    </a:rPr>
                                   </m:ctrlPr>
                                 </m:sSubPr>
                                 <m:e>
                                   <m:r>
-                                    <a:rPr lang="en-US" sz="1400" kern="1200"/>
+                                    <a:rPr lang="en-US" sz="1400" kern="1200">
+                                      <a:latin typeface="Cambria Math" panose="02040503050406030204" pitchFamily="18" charset="0"/>
+                                    </a:rPr>
                                     <m:t>𝜖</m:t>
                                   </m:r>
                                 </m:e>
                                 <m:sub>
                                   <m:r>
-                                    <a:rPr lang="en-US" sz="1400" kern="1200"/>
+                                    <a:rPr lang="en-US" sz="1400" kern="1200">
+                                      <a:latin typeface="Cambria Math" panose="02040503050406030204" pitchFamily="18" charset="0"/>
+                                    </a:rPr>
                                     <m:t>𝑖𝑗</m:t>
                                   </m:r>
                                 </m:sub>
@@ -9670,11 +9740,15 @@
                           <a14:m>
                             <m:oMath xmlns:m="http://schemas.openxmlformats.org/officeDocument/2006/math">
                               <m:r>
-                                <a:rPr lang="en-US" sz="1400" kern="1200" dirty="0" smtClean="0"/>
+                                <a:rPr lang="en-US" sz="1400" kern="1200" dirty="0" smtClean="0">
+                                  <a:latin typeface="Cambria Math" panose="02040503050406030204" pitchFamily="18" charset="0"/>
+                                </a:rPr>
                                 <m:t>𝑁</m:t>
                               </m:r>
                               <m:r>
-                                <a:rPr lang="en-US" sz="1400" kern="1200" dirty="0" smtClean="0"/>
+                                <a:rPr lang="en-US" sz="1400" kern="1200" dirty="0" smtClean="0">
+                                  <a:latin typeface="Cambria Math" panose="02040503050406030204" pitchFamily="18" charset="0"/>
+                                </a:rPr>
                                 <m:t>(0,3)</m:t>
                               </m:r>
                             </m:oMath>
@@ -9704,18 +9778,16 @@
                           </a:pPr>
                           <a:r>
                             <a:rPr lang="en-US" sz="1400" kern="1200" dirty="0" smtClean="0"/>
-                            <a:t>    </a:t>
-                          </a:r>
-                          <a:r>
-                            <a:rPr lang="en-US" sz="1400" kern="1200" dirty="0" smtClean="0"/>
-                            <a:t>2.2 </a:t>
+                            <a:t>    2.2 </a:t>
                           </a:r>
                           <a14:m>
                             <m:oMath xmlns:m="http://schemas.openxmlformats.org/officeDocument/2006/math">
                               <m:d>
                                 <m:dPr>
                                   <m:ctrlPr>
-                                    <a:rPr lang="en-US" sz="1400" kern="1200" smtClean="0"/>
+                                    <a:rPr lang="en-US" sz="1400" i="1" kern="1200" smtClean="0">
+                                      <a:latin typeface="Cambria Math" panose="02040503050406030204" pitchFamily="18" charset="0"/>
+                                    </a:rPr>
                                   </m:ctrlPr>
                                 </m:dPr>
                                 <m:e>
@@ -9723,29 +9795,39 @@
                                     <m:fPr>
                                       <m:type m:val="noBar"/>
                                       <m:ctrlPr>
-                                        <a:rPr lang="en-US" sz="1400" kern="1200" smtClean="0"/>
+                                        <a:rPr lang="en-US" sz="1400" i="1" kern="1200" smtClean="0">
+                                          <a:latin typeface="Cambria Math" panose="02040503050406030204" pitchFamily="18" charset="0"/>
+                                        </a:rPr>
                                       </m:ctrlPr>
                                     </m:fPr>
                                     <m:num>
                                       <m:sSub>
                                         <m:sSubPr>
                                           <m:ctrlPr>
-                                            <a:rPr lang="en-US" sz="1400" kern="1200" smtClean="0"/>
+                                            <a:rPr lang="en-US" sz="1400" i="1" kern="1200" smtClean="0">
+                                              <a:latin typeface="Cambria Math" panose="02040503050406030204" pitchFamily="18" charset="0"/>
+                                            </a:rPr>
                                           </m:ctrlPr>
                                         </m:sSubPr>
                                         <m:e>
                                           <m:r>
-                                            <a:rPr lang="en-US" sz="1400" kern="1200" smtClean="0"/>
+                                            <a:rPr lang="en-US" sz="1400" kern="1200" smtClean="0">
+                                              <a:latin typeface="Cambria Math" panose="02040503050406030204" pitchFamily="18" charset="0"/>
+                                            </a:rPr>
                                             <m:t>𝑏</m:t>
                                           </m:r>
                                         </m:e>
                                         <m:sub>
                                           <m:r>
-                                            <a:rPr lang="en-US" sz="1400" kern="1200" smtClean="0"/>
+                                            <a:rPr lang="en-US" sz="1400" kern="1200" smtClean="0">
+                                              <a:latin typeface="Cambria Math" panose="02040503050406030204" pitchFamily="18" charset="0"/>
+                                            </a:rPr>
                                             <m:t>0</m:t>
                                           </m:r>
                                           <m:r>
-                                            <a:rPr lang="en-US" sz="1400" kern="1200" smtClean="0"/>
+                                            <a:rPr lang="en-US" sz="1400" kern="1200" smtClean="0">
+                                              <a:latin typeface="Cambria Math" panose="02040503050406030204" pitchFamily="18" charset="0"/>
+                                            </a:rPr>
                                             <m:t>𝑖</m:t>
                                           </m:r>
                                         </m:sub>
@@ -9755,18 +9837,24 @@
                                       <m:sSub>
                                         <m:sSubPr>
                                           <m:ctrlPr>
-                                            <a:rPr lang="en-US" sz="1400" kern="1200" smtClean="0"/>
+                                            <a:rPr lang="en-US" sz="1400" i="1" kern="1200" smtClean="0">
+                                              <a:latin typeface="Cambria Math" panose="02040503050406030204" pitchFamily="18" charset="0"/>
+                                            </a:rPr>
                                           </m:ctrlPr>
                                         </m:sSubPr>
                                         <m:e>
                                           <m:r>
-                                            <a:rPr lang="en-US" sz="1400" kern="1200"/>
+                                            <a:rPr lang="en-US" sz="1400" kern="1200">
+                                              <a:latin typeface="Cambria Math" panose="02040503050406030204" pitchFamily="18" charset="0"/>
+                                            </a:rPr>
                                             <m:t>𝑏</m:t>
                                           </m:r>
                                         </m:e>
                                         <m:sub>
                                           <m:r>
-                                            <a:rPr lang="en-US" sz="1400" kern="1200" smtClean="0"/>
+                                            <a:rPr lang="en-US" sz="1400" kern="1200" smtClean="0">
+                                              <a:latin typeface="Cambria Math" panose="02040503050406030204" pitchFamily="18" charset="0"/>
+                                            </a:rPr>
                                             <m:t>1</m:t>
                                           </m:r>
                                         </m:sub>
@@ -9786,38 +9874,52 @@
                               <m:f>
                                 <m:fPr>
                                   <m:ctrlPr>
-                                    <a:rPr lang="en-US" sz="1400" kern="1200" dirty="0" smtClean="0"/>
+                                    <a:rPr lang="en-US" sz="1400" i="1" kern="1200" dirty="0" smtClean="0">
+                                      <a:latin typeface="Cambria Math" panose="02040503050406030204" pitchFamily="18" charset="0"/>
+                                    </a:rPr>
                                   </m:ctrlPr>
                                 </m:fPr>
                                 <m:num>
                                   <m:r>
-                                    <a:rPr lang="en-US" sz="1400" kern="1200" dirty="0" smtClean="0"/>
+                                    <a:rPr lang="en-US" sz="1400" kern="1200" dirty="0" smtClean="0">
+                                      <a:latin typeface="Cambria Math" panose="02040503050406030204" pitchFamily="18" charset="0"/>
+                                    </a:rPr>
                                     <m:t>1</m:t>
                                   </m:r>
                                 </m:num>
                                 <m:den>
                                   <m:r>
-                                    <a:rPr lang="en-US" sz="1400" kern="1200" dirty="0" smtClean="0"/>
+                                    <a:rPr lang="en-US" sz="1400" kern="1200" dirty="0" smtClean="0">
+                                      <a:latin typeface="Cambria Math" panose="02040503050406030204" pitchFamily="18" charset="0"/>
+                                    </a:rPr>
                                     <m:t>3</m:t>
                                   </m:r>
                                 </m:den>
                               </m:f>
                               <m:r>
-                                <a:rPr lang="en-US" sz="1400" kern="1200" dirty="0" smtClean="0"/>
+                                <a:rPr lang="en-US" sz="1400" kern="1200" dirty="0" smtClean="0">
+                                  <a:latin typeface="Cambria Math" panose="02040503050406030204" pitchFamily="18" charset="0"/>
+                                </a:rPr>
                                 <m:t>×</m:t>
                               </m:r>
                               <m:r>
-                                <a:rPr lang="en-US" sz="1400" kern="1200" dirty="0" smtClean="0"/>
+                                <a:rPr lang="en-US" sz="1400" kern="1200" dirty="0" smtClean="0">
+                                  <a:latin typeface="Cambria Math" panose="02040503050406030204" pitchFamily="18" charset="0"/>
+                                </a:rPr>
                                 <m:t>𝑁</m:t>
                               </m:r>
                               <m:r>
-                                <a:rPr lang="en-US" sz="1400" kern="1200" dirty="0" smtClean="0"/>
+                                <a:rPr lang="en-US" sz="1400" kern="1200" dirty="0" smtClean="0">
+                                  <a:latin typeface="Cambria Math" panose="02040503050406030204" pitchFamily="18" charset="0"/>
+                                </a:rPr>
                                 <m:t>(</m:t>
                               </m:r>
                               <m:d>
                                 <m:dPr>
                                   <m:ctrlPr>
-                                    <a:rPr lang="en-US" sz="1400" kern="1200" smtClean="0"/>
+                                    <a:rPr lang="en-US" sz="1400" i="1" kern="1200" smtClean="0">
+                                      <a:latin typeface="Cambria Math" panose="02040503050406030204" pitchFamily="18" charset="0"/>
+                                    </a:rPr>
                                   </m:ctrlPr>
                                 </m:dPr>
                                 <m:e>
@@ -9825,18 +9927,24 @@
                                     <m:fPr>
                                       <m:type m:val="noBar"/>
                                       <m:ctrlPr>
-                                        <a:rPr lang="en-US" sz="1400" kern="1200" smtClean="0"/>
+                                        <a:rPr lang="en-US" sz="1400" i="1" kern="1200" smtClean="0">
+                                          <a:latin typeface="Cambria Math" panose="02040503050406030204" pitchFamily="18" charset="0"/>
+                                        </a:rPr>
                                       </m:ctrlPr>
                                     </m:fPr>
                                     <m:num>
                                       <m:r>
-                                        <a:rPr lang="en-US" sz="1400" kern="1200" smtClean="0"/>
+                                        <a:rPr lang="en-US" sz="1400" kern="1200" smtClean="0">
+                                          <a:latin typeface="Cambria Math" panose="02040503050406030204" pitchFamily="18" charset="0"/>
+                                        </a:rPr>
                                         <m:t>0</m:t>
                                       </m:r>
                                     </m:num>
                                     <m:den>
                                       <m:r>
-                                        <a:rPr lang="en-US" sz="1400" kern="1200" smtClean="0"/>
+                                        <a:rPr lang="en-US" sz="1400" kern="1200" smtClean="0">
+                                          <a:latin typeface="Cambria Math" panose="02040503050406030204" pitchFamily="18" charset="0"/>
+                                        </a:rPr>
                                         <m:t>0</m:t>
                                       </m:r>
                                     </m:den>
@@ -9854,7 +9962,9 @@
                               <m:d>
                                 <m:dPr>
                                   <m:ctrlPr>
-                                    <a:rPr lang="en-US" sz="1400" kern="1200" dirty="0" smtClean="0"/>
+                                    <a:rPr lang="en-US" sz="1400" i="1" kern="1200" dirty="0" smtClean="0">
+                                      <a:latin typeface="Cambria Math" panose="02040503050406030204" pitchFamily="18" charset="0"/>
+                                    </a:rPr>
                                   </m:ctrlPr>
                                 </m:dPr>
                                 <m:e>
@@ -9862,42 +9972,56 @@
                                     <m:fPr>
                                       <m:type m:val="noBar"/>
                                       <m:ctrlPr>
-                                        <a:rPr lang="en-US" sz="1400" kern="1200" dirty="0" smtClean="0"/>
+                                        <a:rPr lang="en-US" sz="1400" i="1" kern="1200" dirty="0" smtClean="0">
+                                          <a:latin typeface="Cambria Math" panose="02040503050406030204" pitchFamily="18" charset="0"/>
+                                        </a:rPr>
                                       </m:ctrlPr>
                                     </m:fPr>
                                     <m:num>
                                       <m:r>
-                                        <a:rPr lang="en-US" sz="1400" kern="1200" dirty="0" smtClean="0"/>
+                                        <a:rPr lang="en-US" sz="1400" kern="1200" dirty="0" smtClean="0">
+                                          <a:latin typeface="Cambria Math" panose="02040503050406030204" pitchFamily="18" charset="0"/>
+                                        </a:rPr>
                                         <m:t>3</m:t>
                                       </m:r>
                                     </m:num>
                                     <m:den>
                                       <m:r>
-                                        <a:rPr lang="en-US" sz="1400" kern="1200" dirty="0" smtClean="0"/>
+                                        <a:rPr lang="en-US" sz="1400" kern="1200" dirty="0" smtClean="0">
+                                          <a:latin typeface="Cambria Math" panose="02040503050406030204" pitchFamily="18" charset="0"/>
+                                        </a:rPr>
                                         <m:t>1.5</m:t>
                                       </m:r>
                                     </m:den>
                                   </m:f>
                                   <m:r>
-                                    <a:rPr lang="en-US" sz="1400" kern="1200" dirty="0" smtClean="0"/>
+                                    <a:rPr lang="en-US" sz="1400" kern="1200" dirty="0" smtClean="0">
+                                      <a:latin typeface="Cambria Math" panose="02040503050406030204" pitchFamily="18" charset="0"/>
+                                    </a:rPr>
                                     <m:t> </m:t>
                                   </m:r>
                                   <m:f>
                                     <m:fPr>
                                       <m:type m:val="noBar"/>
                                       <m:ctrlPr>
-                                        <a:rPr lang="en-US" sz="1400" kern="1200" dirty="0" smtClean="0"/>
+                                        <a:rPr lang="en-US" sz="1400" i="1" kern="1200" dirty="0" smtClean="0">
+                                          <a:latin typeface="Cambria Math" panose="02040503050406030204" pitchFamily="18" charset="0"/>
+                                        </a:rPr>
                                       </m:ctrlPr>
                                     </m:fPr>
                                     <m:num>
                                       <m:r>
-                                        <a:rPr lang="en-US" sz="1400" kern="1200" dirty="0" smtClean="0"/>
+                                        <a:rPr lang="en-US" sz="1400" kern="1200" dirty="0" smtClean="0">
+                                          <a:latin typeface="Cambria Math" panose="02040503050406030204" pitchFamily="18" charset="0"/>
+                                        </a:rPr>
                                         <m:t>1.5</m:t>
                                       </m:r>
                                     </m:num>
                                     <m:den>
                                       <m:r>
-                                        <a:rPr lang="en-US" sz="1400" kern="1200" dirty="0" smtClean="0"/>
+                                        <a:rPr lang="en-US" sz="1400" kern="1200" dirty="0" smtClean="0">
+                                          <a:latin typeface="Cambria Math" panose="02040503050406030204" pitchFamily="18" charset="0"/>
+                                        </a:rPr>
                                         <m:t>2</m:t>
                                       </m:r>
                                     </m:den>
@@ -9905,44 +10029,60 @@
                                 </m:e>
                               </m:d>
                               <m:r>
-                                <a:rPr lang="en-US" sz="1400" kern="1200" dirty="0" smtClean="0"/>
+                                <a:rPr lang="en-US" sz="1400" kern="1200" dirty="0" smtClean="0">
+                                  <a:latin typeface="Cambria Math" panose="02040503050406030204" pitchFamily="18" charset="0"/>
+                                </a:rPr>
                                 <m:t>)+</m:t>
                               </m:r>
                               <m:f>
                                 <m:fPr>
                                   <m:ctrlPr>
-                                    <a:rPr lang="en-US" sz="1400" kern="1200" dirty="0" smtClean="0"/>
+                                    <a:rPr lang="en-US" sz="1400" i="1" kern="1200" dirty="0" smtClean="0">
+                                      <a:latin typeface="Cambria Math" panose="02040503050406030204" pitchFamily="18" charset="0"/>
+                                    </a:rPr>
                                   </m:ctrlPr>
                                 </m:fPr>
                                 <m:num>
                                   <m:r>
-                                    <a:rPr lang="en-US" sz="1400" kern="1200" dirty="0" smtClean="0"/>
+                                    <a:rPr lang="en-US" sz="1400" kern="1200" dirty="0" smtClean="0">
+                                      <a:latin typeface="Cambria Math" panose="02040503050406030204" pitchFamily="18" charset="0"/>
+                                    </a:rPr>
                                     <m:t>2</m:t>
                                   </m:r>
                                 </m:num>
                                 <m:den>
                                   <m:r>
-                                    <a:rPr lang="en-US" sz="1400" kern="1200" dirty="0" smtClean="0"/>
+                                    <a:rPr lang="en-US" sz="1400" kern="1200" dirty="0" smtClean="0">
+                                      <a:latin typeface="Cambria Math" panose="02040503050406030204" pitchFamily="18" charset="0"/>
+                                    </a:rPr>
                                     <m:t>3</m:t>
                                   </m:r>
                                 </m:den>
                               </m:f>
                               <m:r>
-                                <a:rPr lang="en-US" sz="1400" kern="1200" dirty="0" smtClean="0"/>
+                                <a:rPr lang="en-US" sz="1400" kern="1200" dirty="0" smtClean="0">
+                                  <a:latin typeface="Cambria Math" panose="02040503050406030204" pitchFamily="18" charset="0"/>
+                                </a:rPr>
                                 <m:t>×</m:t>
                               </m:r>
                               <m:r>
-                                <a:rPr lang="en-US" sz="1400" kern="1200" dirty="0" smtClean="0"/>
+                                <a:rPr lang="en-US" sz="1400" kern="1200" dirty="0" smtClean="0">
+                                  <a:latin typeface="Cambria Math" panose="02040503050406030204" pitchFamily="18" charset="0"/>
+                                </a:rPr>
                                 <m:t>𝑁</m:t>
                               </m:r>
                               <m:r>
-                                <a:rPr lang="en-US" sz="1400" kern="1200" dirty="0" smtClean="0"/>
+                                <a:rPr lang="en-US" sz="1400" kern="1200" dirty="0" smtClean="0">
+                                  <a:latin typeface="Cambria Math" panose="02040503050406030204" pitchFamily="18" charset="0"/>
+                                </a:rPr>
                                 <m:t>(</m:t>
                               </m:r>
                               <m:d>
                                 <m:dPr>
                                   <m:ctrlPr>
-                                    <a:rPr lang="en-US" sz="1400" kern="1200" smtClean="0"/>
+                                    <a:rPr lang="en-US" sz="1400" i="1" kern="1200" smtClean="0">
+                                      <a:latin typeface="Cambria Math" panose="02040503050406030204" pitchFamily="18" charset="0"/>
+                                    </a:rPr>
                                   </m:ctrlPr>
                                 </m:dPr>
                                 <m:e>
@@ -9950,18 +10090,24 @@
                                     <m:fPr>
                                       <m:type m:val="noBar"/>
                                       <m:ctrlPr>
-                                        <a:rPr lang="en-US" sz="1400" kern="1200" smtClean="0"/>
+                                        <a:rPr lang="en-US" sz="1400" i="1" kern="1200" smtClean="0">
+                                          <a:latin typeface="Cambria Math" panose="02040503050406030204" pitchFamily="18" charset="0"/>
+                                        </a:rPr>
                                       </m:ctrlPr>
                                     </m:fPr>
                                     <m:num>
                                       <m:r>
-                                        <a:rPr lang="en-US" sz="1400" kern="1200" smtClean="0"/>
+                                        <a:rPr lang="en-US" sz="1400" kern="1200" smtClean="0">
+                                          <a:latin typeface="Cambria Math" panose="02040503050406030204" pitchFamily="18" charset="0"/>
+                                        </a:rPr>
                                         <m:t>0</m:t>
                                       </m:r>
                                     </m:num>
                                     <m:den>
                                       <m:r>
-                                        <a:rPr lang="en-US" sz="1400" kern="1200" smtClean="0"/>
+                                        <a:rPr lang="en-US" sz="1400" kern="1200" smtClean="0">
+                                          <a:latin typeface="Cambria Math" panose="02040503050406030204" pitchFamily="18" charset="0"/>
+                                        </a:rPr>
                                         <m:t>0</m:t>
                                       </m:r>
                                     </m:den>
@@ -9979,7 +10125,9 @@
                               <m:d>
                                 <m:dPr>
                                   <m:ctrlPr>
-                                    <a:rPr lang="en-US" sz="1400" kern="1200" dirty="0" smtClean="0"/>
+                                    <a:rPr lang="en-US" sz="1400" i="1" kern="1200" dirty="0" smtClean="0">
+                                      <a:latin typeface="Cambria Math" panose="02040503050406030204" pitchFamily="18" charset="0"/>
+                                    </a:rPr>
                                   </m:ctrlPr>
                                 </m:dPr>
                                 <m:e>
@@ -9987,42 +10135,56 @@
                                     <m:fPr>
                                       <m:type m:val="noBar"/>
                                       <m:ctrlPr>
-                                        <a:rPr lang="en-US" sz="1400" kern="1200" dirty="0" smtClean="0"/>
+                                        <a:rPr lang="en-US" sz="1400" i="1" kern="1200" dirty="0" smtClean="0">
+                                          <a:latin typeface="Cambria Math" panose="02040503050406030204" pitchFamily="18" charset="0"/>
+                                        </a:rPr>
                                       </m:ctrlPr>
                                     </m:fPr>
                                     <m:num>
                                       <m:r>
-                                        <a:rPr lang="en-US" sz="1400" kern="1200" dirty="0" smtClean="0"/>
+                                        <a:rPr lang="en-US" sz="1400" kern="1200" dirty="0" smtClean="0">
+                                          <a:latin typeface="Cambria Math" panose="02040503050406030204" pitchFamily="18" charset="0"/>
+                                        </a:rPr>
                                         <m:t>2</m:t>
                                       </m:r>
                                     </m:num>
                                     <m:den>
                                       <m:r>
-                                        <a:rPr lang="en-US" sz="1400" kern="1200" dirty="0" smtClean="0"/>
+                                        <a:rPr lang="en-US" sz="1400" kern="1200" dirty="0" smtClean="0">
+                                          <a:latin typeface="Cambria Math" panose="02040503050406030204" pitchFamily="18" charset="0"/>
+                                        </a:rPr>
                                         <m:t>1</m:t>
                                       </m:r>
                                     </m:den>
                                   </m:f>
                                   <m:r>
-                                    <a:rPr lang="en-US" sz="1400" kern="1200" dirty="0" smtClean="0"/>
+                                    <a:rPr lang="en-US" sz="1400" kern="1200" dirty="0" smtClean="0">
+                                      <a:latin typeface="Cambria Math" panose="02040503050406030204" pitchFamily="18" charset="0"/>
+                                    </a:rPr>
                                     <m:t> </m:t>
                                   </m:r>
                                   <m:f>
                                     <m:fPr>
                                       <m:type m:val="noBar"/>
                                       <m:ctrlPr>
-                                        <a:rPr lang="en-US" sz="1400" kern="1200" dirty="0" smtClean="0"/>
+                                        <a:rPr lang="en-US" sz="1400" i="1" kern="1200" dirty="0" smtClean="0">
+                                          <a:latin typeface="Cambria Math" panose="02040503050406030204" pitchFamily="18" charset="0"/>
+                                        </a:rPr>
                                       </m:ctrlPr>
                                     </m:fPr>
                                     <m:num>
                                       <m:r>
-                                        <a:rPr lang="en-US" sz="1400" kern="1200" dirty="0" smtClean="0"/>
+                                        <a:rPr lang="en-US" sz="1400" kern="1200" dirty="0" smtClean="0">
+                                          <a:latin typeface="Cambria Math" panose="02040503050406030204" pitchFamily="18" charset="0"/>
+                                        </a:rPr>
                                         <m:t>1</m:t>
                                       </m:r>
                                     </m:num>
                                     <m:den>
                                       <m:r>
-                                        <a:rPr lang="en-US" sz="1400" kern="1200" dirty="0" smtClean="0"/>
+                                        <a:rPr lang="en-US" sz="1400" kern="1200" dirty="0" smtClean="0">
+                                          <a:latin typeface="Cambria Math" panose="02040503050406030204" pitchFamily="18" charset="0"/>
+                                        </a:rPr>
                                         <m:t>4</m:t>
                                       </m:r>
                                     </m:den>
@@ -10030,7 +10192,9 @@
                                 </m:e>
                               </m:d>
                               <m:r>
-                                <a:rPr lang="en-US" sz="1400" kern="1200" dirty="0" smtClean="0"/>
+                                <a:rPr lang="en-US" sz="1400" kern="1200" dirty="0" smtClean="0">
+                                  <a:latin typeface="Cambria Math" panose="02040503050406030204" pitchFamily="18" charset="0"/>
+                                </a:rPr>
                                 <m:t>)</m:t>
                               </m:r>
                             </m:oMath>
@@ -10044,18 +10208,24 @@
                               <m:sSub>
                                 <m:sSubPr>
                                   <m:ctrlPr>
-                                    <a:rPr lang="en-US" sz="1400" kern="1200" smtClean="0"/>
+                                    <a:rPr lang="en-US" sz="1400" i="1" kern="1200" smtClean="0">
+                                      <a:latin typeface="Cambria Math" panose="02040503050406030204" pitchFamily="18" charset="0"/>
+                                    </a:rPr>
                                   </m:ctrlPr>
                                 </m:sSubPr>
                                 <m:e>
                                   <m:r>
-                                    <a:rPr lang="en-US" sz="1400" kern="1200"/>
+                                    <a:rPr lang="en-US" sz="1400" kern="1200">
+                                      <a:latin typeface="Cambria Math" panose="02040503050406030204" pitchFamily="18" charset="0"/>
+                                    </a:rPr>
                                     <m:t>𝜖</m:t>
                                   </m:r>
                                 </m:e>
                                 <m:sub>
                                   <m:r>
-                                    <a:rPr lang="en-US" sz="1400" kern="1200"/>
+                                    <a:rPr lang="en-US" sz="1400" kern="1200">
+                                      <a:latin typeface="Cambria Math" panose="02040503050406030204" pitchFamily="18" charset="0"/>
+                                    </a:rPr>
                                     <m:t>𝑖𝑗</m:t>
                                   </m:r>
                                 </m:sub>
@@ -10069,11 +10239,15 @@
                           <a14:m>
                             <m:oMath xmlns:m="http://schemas.openxmlformats.org/officeDocument/2006/math">
                               <m:r>
-                                <a:rPr lang="en-US" sz="1400" kern="1200" dirty="0" smtClean="0"/>
+                                <a:rPr lang="en-US" sz="1400" kern="1200" dirty="0" smtClean="0">
+                                  <a:latin typeface="Cambria Math" panose="02040503050406030204" pitchFamily="18" charset="0"/>
+                                </a:rPr>
                                 <m:t>𝑁</m:t>
                               </m:r>
                               <m:r>
-                                <a:rPr lang="en-US" sz="1400" kern="1200" dirty="0" smtClean="0"/>
+                                <a:rPr lang="en-US" sz="1400" kern="1200" dirty="0" smtClean="0">
+                                  <a:latin typeface="Cambria Math" panose="02040503050406030204" pitchFamily="18" charset="0"/>
+                                </a:rPr>
                                 <m:t>(0,3)</m:t>
                               </m:r>
                             </m:oMath>
@@ -10358,18 +10532,24 @@
                               <m:sSub>
                                 <m:sSubPr>
                                   <m:ctrlPr>
-                                    <a:rPr lang="en-US" sz="1400" kern="1200" smtClean="0"/>
+                                    <a:rPr lang="en-US" sz="1400" i="1" kern="1200" smtClean="0">
+                                      <a:latin typeface="Cambria Math" panose="02040503050406030204" pitchFamily="18" charset="0"/>
+                                    </a:rPr>
                                   </m:ctrlPr>
                                 </m:sSubPr>
                                 <m:e>
                                   <m:r>
-                                    <a:rPr lang="en-US" sz="1400" kern="1200"/>
+                                    <a:rPr lang="en-US" sz="1400" kern="1200">
+                                      <a:latin typeface="Cambria Math" panose="02040503050406030204" pitchFamily="18" charset="0"/>
+                                    </a:rPr>
                                     <m:t>𝛽</m:t>
                                   </m:r>
                                 </m:e>
                                 <m:sub>
                                   <m:r>
-                                    <a:rPr lang="en-US" sz="1400" kern="1200" smtClean="0"/>
+                                    <a:rPr lang="en-US" sz="1400" kern="1200" smtClean="0">
+                                      <a:latin typeface="Cambria Math" panose="02040503050406030204" pitchFamily="18" charset="0"/>
+                                    </a:rPr>
                                     <m:t>1</m:t>
                                   </m:r>
                                 </m:sub>
@@ -10673,30 +10853,37 @@
                               <m:sSub>
                                 <m:sSubPr>
                                   <m:ctrlPr>
-                                    <a:rPr lang="en-US" sz="1400" kern="1200" smtClean="0"/>
+                                    <a:rPr lang="en-US" sz="1400" i="1" kern="1200" smtClean="0">
+                                      <a:latin typeface="Cambria Math" panose="02040503050406030204" pitchFamily="18" charset="0"/>
+                                    </a:rPr>
                                   </m:ctrlPr>
                                 </m:sSubPr>
                                 <m:e>
                                   <m:r>
-                                    <a:rPr lang="en-US" sz="1400" kern="1200" smtClean="0"/>
-                                    <m:t>𝛼</m:t>
+                                    <a:rPr lang="en-US" sz="1400" kern="1200">
+                                      <a:latin typeface="Cambria Math" panose="02040503050406030204" pitchFamily="18" charset="0"/>
+                                    </a:rPr>
+                                    <m:t>𝛽</m:t>
                                   </m:r>
                                 </m:e>
                                 <m:sub>
                                   <m:r>
-                                    <m:rPr>
-                                      <m:sty m:val="p"/>
-                                    </m:rPr>
-                                    <a:rPr lang="en-US" sz="1400" kern="1200" smtClean="0"/>
-                                    <m:t>i</m:t>
+                                    <a:rPr lang="en-US" sz="1400" b="0" i="0" kern="1200" smtClean="0">
+                                      <a:latin typeface="Cambria Math" panose="02040503050406030204" pitchFamily="18" charset="0"/>
+                                    </a:rPr>
+                                    <m:t>2</m:t>
                                   </m:r>
                                 </m:sub>
                               </m:sSub>
                             </m:oMath>
                           </a14:m>
                           <a:r>
+                            <a:rPr lang="en-US" sz="1400" kern="1200" dirty="0" smtClean="0"/>
+                            <a:t>(</a:t>
+                          </a:r>
+                          <a:r>
                             <a:rPr lang="en-US" sz="1400" kern="1200" dirty="0"/>
-                            <a:t>(1)</a:t>
+                            <a:t>1)</a:t>
                           </a:r>
                           <a:endParaRPr lang="en-US" sz="1400" kern="1200" dirty="0">
                             <a:solidFill>
@@ -10991,19 +11178,25 @@
                               <m:sSub>
                                 <m:sSubPr>
                                   <m:ctrlPr>
-                                    <a:rPr lang="en-US" sz="1400" kern="1200" smtClean="0"/>
+                                    <a:rPr lang="en-US" sz="1400" i="1" kern="1200" smtClean="0">
+                                      <a:latin typeface="Cambria Math" panose="02040503050406030204" pitchFamily="18" charset="0"/>
+                                    </a:rPr>
                                   </m:ctrlPr>
                                 </m:sSubPr>
                                 <m:e>
                                   <m:r>
-                                    <a:rPr lang="en-US" sz="1400" kern="1200"/>
+                                    <a:rPr lang="en-US" sz="1400" kern="1200">
+                                      <a:latin typeface="Cambria Math" panose="02040503050406030204" pitchFamily="18" charset="0"/>
+                                    </a:rPr>
                                     <m:t>𝛽</m:t>
                                   </m:r>
                                 </m:e>
                                 <m:sub>
                                   <m:r>
-                                    <a:rPr lang="en-US" sz="1400" kern="1200" smtClean="0"/>
-                                    <m:t>2</m:t>
+                                    <a:rPr lang="en-US" sz="1400" b="0" i="0" kern="1200" smtClean="0">
+                                      <a:latin typeface="Cambria Math" panose="02040503050406030204" pitchFamily="18" charset="0"/>
+                                    </a:rPr>
+                                    <m:t>3</m:t>
                                   </m:r>
                                 </m:sub>
                               </m:sSub>
@@ -11894,7 +12087,7 @@
                 <p:ph idx="1"/>
                 <p:extLst>
                   <p:ext uri="{D42A27DB-BD31-4B8C-83A1-F6EECF244321}">
-                    <p14:modId xmlns:p14="http://schemas.microsoft.com/office/powerpoint/2010/main" val="3941945525"/>
+                    <p14:modId xmlns:p14="http://schemas.microsoft.com/office/powerpoint/2010/main" val="4200599983"/>
                   </p:ext>
                 </p:extLst>
               </p:nvPr>
@@ -12394,11 +12587,7 @@
                           <a:pPr algn="ctr"/>
                           <a:r>
                             <a:rPr lang="en-US" sz="1400" kern="1200" dirty="0" smtClean="0"/>
-                            <a:t>(</a:t>
-                          </a:r>
-                          <a:r>
-                            <a:rPr lang="en-US" sz="1400" kern="1200" dirty="0" smtClean="0"/>
-                            <a:t>SE)</a:t>
+                            <a:t>(SE)</a:t>
                           </a:r>
                           <a:endParaRPr lang="en-US" sz="1400" kern="1200" dirty="0">
                             <a:solidFill>
@@ -15012,8 +15201,8 @@
           </p:graphicFrame>
         </mc:Fallback>
       </mc:AlternateContent>
-      <mc:AlternateContent xmlns:mc="http://schemas.openxmlformats.org/markup-compatibility/2006">
-        <mc:Choice xmlns:a14="http://schemas.microsoft.com/office/drawing/2010/main" Requires="a14">
+      <mc:AlternateContent xmlns:mc="http://schemas.openxmlformats.org/markup-compatibility/2006" xmlns:a14="http://schemas.microsoft.com/office/drawing/2010/main">
+        <mc:Choice Requires="a14">
           <p:sp>
             <p:nvSpPr>
               <p:cNvPr id="8" name="TextBox 7"/>
@@ -16079,7 +16268,7 @@
             </p:txBody>
           </p:sp>
         </mc:Choice>
-        <mc:Fallback>
+        <mc:Fallback xmlns="">
           <p:sp>
             <p:nvSpPr>
               <p:cNvPr id="8" name="TextBox 7"/>

</xml_diff>